<commit_message>
next part presentation done?
</commit_message>
<xml_diff>
--- a/2022/whkyhac2022/pres-whkyhac.pptx
+++ b/2022/whkyhac2022/pres-whkyhac.pptx
@@ -9,17 +9,16 @@
     <p:sldId id="257" r:id="rId3"/>
     <p:sldId id="258" r:id="rId4"/>
     <p:sldId id="259" r:id="rId5"/>
-    <p:sldId id="260" r:id="rId6"/>
-    <p:sldId id="261" r:id="rId7"/>
+    <p:sldId id="261" r:id="rId6"/>
+    <p:sldId id="271" r:id="rId7"/>
     <p:sldId id="262" r:id="rId8"/>
-    <p:sldId id="263" r:id="rId9"/>
-    <p:sldId id="264" r:id="rId10"/>
-    <p:sldId id="265" r:id="rId11"/>
-    <p:sldId id="266" r:id="rId12"/>
-    <p:sldId id="267" r:id="rId13"/>
-    <p:sldId id="268" r:id="rId14"/>
-    <p:sldId id="269" r:id="rId15"/>
-    <p:sldId id="270" r:id="rId16"/>
+    <p:sldId id="264" r:id="rId9"/>
+    <p:sldId id="265" r:id="rId10"/>
+    <p:sldId id="266" r:id="rId11"/>
+    <p:sldId id="267" r:id="rId12"/>
+    <p:sldId id="268" r:id="rId13"/>
+    <p:sldId id="269" r:id="rId14"/>
+    <p:sldId id="270" r:id="rId15"/>
   </p:sldIdLst>
   <p:sldSz cx="12192000" cy="6858000"/>
   <p:notesSz cx="6858000" cy="9144000"/>
@@ -118,6 +117,11 @@
       </a:defRPr>
     </a:lvl9pPr>
   </p:defaultTextStyle>
+  <p:extLst>
+    <p:ext uri="{EFAFB233-063F-42B5-8137-9DF3F51BA10A}">
+      <p15:sldGuideLst xmlns:p15="http://schemas.microsoft.com/office/powerpoint/2012/main"/>
+    </p:ext>
+  </p:extLst>
 </p:presentation>
 </file>
 
@@ -629,7 +633,7 @@
           <a:p>
             <a:fld id="{A6B4AE48-0A7E-3C43-8256-DFDAC9D22CFA}" type="datetimeFigureOut">
               <a:rPr lang="en-GB" smtClean="0"/>
-              <a:t>05/07/2022</a:t>
+              <a:t>06/07/2022</a:t>
             </a:fld>
             <a:endParaRPr lang="en-GB"/>
           </a:p>
@@ -1611,7 +1615,7 @@
           <a:p>
             <a:fld id="{A6B4AE48-0A7E-3C43-8256-DFDAC9D22CFA}" type="datetimeFigureOut">
               <a:rPr lang="en-GB" smtClean="0"/>
-              <a:t>05/07/2022</a:t>
+              <a:t>06/07/2022</a:t>
             </a:fld>
             <a:endParaRPr lang="en-GB"/>
           </a:p>
@@ -2481,7 +2485,7 @@
           <a:p>
             <a:fld id="{A6B4AE48-0A7E-3C43-8256-DFDAC9D22CFA}" type="datetimeFigureOut">
               <a:rPr lang="en-GB" smtClean="0"/>
-              <a:t>05/07/2022</a:t>
+              <a:t>06/07/2022</a:t>
             </a:fld>
             <a:endParaRPr lang="en-GB"/>
           </a:p>
@@ -3502,7 +3506,7 @@
           <a:p>
             <a:fld id="{A6B4AE48-0A7E-3C43-8256-DFDAC9D22CFA}" type="datetimeFigureOut">
               <a:rPr lang="en-GB" smtClean="0"/>
-              <a:t>05/07/2022</a:t>
+              <a:t>06/07/2022</a:t>
             </a:fld>
             <a:endParaRPr lang="en-GB"/>
           </a:p>
@@ -4422,7 +4426,7 @@
           <a:p>
             <a:fld id="{A6B4AE48-0A7E-3C43-8256-DFDAC9D22CFA}" type="datetimeFigureOut">
               <a:rPr lang="en-GB" smtClean="0"/>
-              <a:t>05/07/2022</a:t>
+              <a:t>06/07/2022</a:t>
             </a:fld>
             <a:endParaRPr lang="en-GB"/>
           </a:p>
@@ -5078,7 +5082,7 @@
           <a:p>
             <a:fld id="{A6B4AE48-0A7E-3C43-8256-DFDAC9D22CFA}" type="datetimeFigureOut">
               <a:rPr lang="en-GB" smtClean="0"/>
-              <a:t>05/07/2022</a:t>
+              <a:t>06/07/2022</a:t>
             </a:fld>
             <a:endParaRPr lang="en-GB"/>
           </a:p>
@@ -5935,7 +5939,7 @@
           <a:p>
             <a:fld id="{A6B4AE48-0A7E-3C43-8256-DFDAC9D22CFA}" type="datetimeFigureOut">
               <a:rPr lang="en-GB" smtClean="0"/>
-              <a:t>05/07/2022</a:t>
+              <a:t>06/07/2022</a:t>
             </a:fld>
             <a:endParaRPr lang="en-GB"/>
           </a:p>
@@ -6118,7 +6122,7 @@
           <a:p>
             <a:fld id="{A6B4AE48-0A7E-3C43-8256-DFDAC9D22CFA}" type="datetimeFigureOut">
               <a:rPr lang="en-GB" smtClean="0"/>
-              <a:t>05/07/2022</a:t>
+              <a:t>06/07/2022</a:t>
             </a:fld>
             <a:endParaRPr lang="en-GB"/>
           </a:p>
@@ -6975,7 +6979,7 @@
           <a:p>
             <a:fld id="{A6B4AE48-0A7E-3C43-8256-DFDAC9D22CFA}" type="datetimeFigureOut">
               <a:rPr lang="en-GB" smtClean="0"/>
-              <a:t>05/07/2022</a:t>
+              <a:t>06/07/2022</a:t>
             </a:fld>
             <a:endParaRPr lang="en-GB"/>
           </a:p>
@@ -7194,7 +7198,7 @@
           <a:p>
             <a:fld id="{A6B4AE48-0A7E-3C43-8256-DFDAC9D22CFA}" type="datetimeFigureOut">
               <a:rPr lang="en-GB" smtClean="0"/>
-              <a:t>05/07/2022</a:t>
+              <a:t>06/07/2022</a:t>
             </a:fld>
             <a:endParaRPr lang="en-GB"/>
           </a:p>
@@ -8119,7 +8123,7 @@
           <a:p>
             <a:fld id="{A6B4AE48-0A7E-3C43-8256-DFDAC9D22CFA}" type="datetimeFigureOut">
               <a:rPr lang="en-GB" smtClean="0"/>
-              <a:t>05/07/2022</a:t>
+              <a:t>06/07/2022</a:t>
             </a:fld>
             <a:endParaRPr lang="en-GB"/>
           </a:p>
@@ -8403,7 +8407,7 @@
           <a:p>
             <a:fld id="{A6B4AE48-0A7E-3C43-8256-DFDAC9D22CFA}" type="datetimeFigureOut">
               <a:rPr lang="en-GB" smtClean="0"/>
-              <a:t>05/07/2022</a:t>
+              <a:t>06/07/2022</a:t>
             </a:fld>
             <a:endParaRPr lang="en-GB"/>
           </a:p>
@@ -8793,7 +8797,7 @@
           <a:p>
             <a:fld id="{A6B4AE48-0A7E-3C43-8256-DFDAC9D22CFA}" type="datetimeFigureOut">
               <a:rPr lang="en-GB" smtClean="0"/>
-              <a:t>05/07/2022</a:t>
+              <a:t>06/07/2022</a:t>
             </a:fld>
             <a:endParaRPr lang="en-GB"/>
           </a:p>
@@ -8919,7 +8923,7 @@
           <a:p>
             <a:fld id="{A6B4AE48-0A7E-3C43-8256-DFDAC9D22CFA}" type="datetimeFigureOut">
               <a:rPr lang="en-GB" smtClean="0"/>
-              <a:t>05/07/2022</a:t>
+              <a:t>06/07/2022</a:t>
             </a:fld>
             <a:endParaRPr lang="en-GB"/>
           </a:p>
@@ -9014,7 +9018,7 @@
           <a:p>
             <a:fld id="{A6B4AE48-0A7E-3C43-8256-DFDAC9D22CFA}" type="datetimeFigureOut">
               <a:rPr lang="en-GB" smtClean="0"/>
-              <a:t>05/07/2022</a:t>
+              <a:t>06/07/2022</a:t>
             </a:fld>
             <a:endParaRPr lang="en-GB"/>
           </a:p>
@@ -9985,7 +9989,7 @@
           <a:p>
             <a:fld id="{A6B4AE48-0A7E-3C43-8256-DFDAC9D22CFA}" type="datetimeFigureOut">
               <a:rPr lang="en-GB" smtClean="0"/>
-              <a:t>05/07/2022</a:t>
+              <a:t>06/07/2022</a:t>
             </a:fld>
             <a:endParaRPr lang="en-GB"/>
           </a:p>
@@ -10980,7 +10984,7 @@
           <a:p>
             <a:fld id="{A6B4AE48-0A7E-3C43-8256-DFDAC9D22CFA}" type="datetimeFigureOut">
               <a:rPr lang="en-GB" smtClean="0"/>
-              <a:t>05/07/2022</a:t>
+              <a:t>06/07/2022</a:t>
             </a:fld>
             <a:endParaRPr lang="en-GB"/>
           </a:p>
@@ -11864,7 +11868,7 @@
           <a:p>
             <a:fld id="{A6B4AE48-0A7E-3C43-8256-DFDAC9D22CFA}" type="datetimeFigureOut">
               <a:rPr lang="en-GB" smtClean="0"/>
-              <a:t>05/07/2022</a:t>
+              <a:t>06/07/2022</a:t>
             </a:fld>
             <a:endParaRPr lang="en-GB"/>
           </a:p>
@@ -12519,7 +12523,7 @@
           <p:cNvPr id="2" name="Title 1">
             <a:extLst>
               <a:ext uri="{FF2B5EF4-FFF2-40B4-BE49-F238E27FC236}">
-                <a16:creationId xmlns:a16="http://schemas.microsoft.com/office/drawing/2014/main" id="{D7149846-BE3C-2251-3434-040C151638B6}"/>
+                <a16:creationId xmlns:a16="http://schemas.microsoft.com/office/drawing/2014/main" id="{F0199FC6-3B0E-0D54-34CF-A88291BFB5E5}"/>
               </a:ext>
             </a:extLst>
           </p:cNvPr>
@@ -12537,7 +12541,7 @@
           <a:p>
             <a:r>
               <a:rPr lang="en-GB" dirty="0"/>
-              <a:t>Results NWHL</a:t>
+              <a:t>Evaluation Danger Index </a:t>
             </a:r>
           </a:p>
         </p:txBody>
@@ -12547,7 +12551,7 @@
           <p:cNvPr id="3" name="Content Placeholder 2">
             <a:extLst>
               <a:ext uri="{FF2B5EF4-FFF2-40B4-BE49-F238E27FC236}">
-                <a16:creationId xmlns:a16="http://schemas.microsoft.com/office/drawing/2014/main" id="{A013E51C-3D44-B7A8-B16D-CE63156589EE}"/>
+                <a16:creationId xmlns:a16="http://schemas.microsoft.com/office/drawing/2014/main" id="{FB1C153B-30C5-B4EE-C6E9-B7AD0002AADC}"/>
               </a:ext>
             </a:extLst>
           </p:cNvPr>
@@ -12570,7 +12574,7 @@
     </p:spTree>
     <p:extLst>
       <p:ext uri="{BB962C8B-B14F-4D97-AF65-F5344CB8AC3E}">
-        <p14:creationId xmlns:p14="http://schemas.microsoft.com/office/powerpoint/2010/main" val="2190234350"/>
+        <p14:creationId xmlns:p14="http://schemas.microsoft.com/office/powerpoint/2010/main" val="3744239089"/>
       </p:ext>
     </p:extLst>
   </p:cSld>
@@ -12602,7 +12606,7 @@
           <p:cNvPr id="2" name="Title 1">
             <a:extLst>
               <a:ext uri="{FF2B5EF4-FFF2-40B4-BE49-F238E27FC236}">
-                <a16:creationId xmlns:a16="http://schemas.microsoft.com/office/drawing/2014/main" id="{F0199FC6-3B0E-0D54-34CF-A88291BFB5E5}"/>
+                <a16:creationId xmlns:a16="http://schemas.microsoft.com/office/drawing/2014/main" id="{51312286-7EF2-7F1E-C33B-DF05C65F4239}"/>
               </a:ext>
             </a:extLst>
           </p:cNvPr>
@@ -12620,7 +12624,7 @@
           <a:p>
             <a:r>
               <a:rPr lang="en-GB" dirty="0"/>
-              <a:t>Evaluation Danger Index </a:t>
+              <a:t>Tracking Data: Creating Space</a:t>
             </a:r>
           </a:p>
         </p:txBody>
@@ -12630,7 +12634,7 @@
           <p:cNvPr id="3" name="Content Placeholder 2">
             <a:extLst>
               <a:ext uri="{FF2B5EF4-FFF2-40B4-BE49-F238E27FC236}">
-                <a16:creationId xmlns:a16="http://schemas.microsoft.com/office/drawing/2014/main" id="{FB1C153B-30C5-B4EE-C6E9-B7AD0002AADC}"/>
+                <a16:creationId xmlns:a16="http://schemas.microsoft.com/office/drawing/2014/main" id="{1CAFF31D-6B71-FD28-0759-A3C83E086230}"/>
               </a:ext>
             </a:extLst>
           </p:cNvPr>
@@ -12653,7 +12657,7 @@
     </p:spTree>
     <p:extLst>
       <p:ext uri="{BB962C8B-B14F-4D97-AF65-F5344CB8AC3E}">
-        <p14:creationId xmlns:p14="http://schemas.microsoft.com/office/powerpoint/2010/main" val="3744239089"/>
+        <p14:creationId xmlns:p14="http://schemas.microsoft.com/office/powerpoint/2010/main" val="2319132127"/>
       </p:ext>
     </p:extLst>
   </p:cSld>
@@ -12703,7 +12707,7 @@
           <a:p>
             <a:r>
               <a:rPr lang="en-GB" dirty="0"/>
-              <a:t>Tracking Data: Creating Space</a:t>
+              <a:t>Tracking Data: Keeping Structure</a:t>
             </a:r>
           </a:p>
         </p:txBody>
@@ -12729,14 +12733,14 @@
           <a:bodyPr/>
           <a:lstStyle/>
           <a:p>
-            <a:endParaRPr lang="en-GB"/>
+            <a:endParaRPr lang="en-GB" dirty="0"/>
           </a:p>
         </p:txBody>
       </p:sp>
     </p:spTree>
     <p:extLst>
       <p:ext uri="{BB962C8B-B14F-4D97-AF65-F5344CB8AC3E}">
-        <p14:creationId xmlns:p14="http://schemas.microsoft.com/office/powerpoint/2010/main" val="2319132127"/>
+        <p14:creationId xmlns:p14="http://schemas.microsoft.com/office/powerpoint/2010/main" val="566271480"/>
       </p:ext>
     </p:extLst>
   </p:cSld>
@@ -12768,89 +12772,6 @@
           <p:cNvPr id="2" name="Title 1">
             <a:extLst>
               <a:ext uri="{FF2B5EF4-FFF2-40B4-BE49-F238E27FC236}">
-                <a16:creationId xmlns:a16="http://schemas.microsoft.com/office/drawing/2014/main" id="{51312286-7EF2-7F1E-C33B-DF05C65F4239}"/>
-              </a:ext>
-            </a:extLst>
-          </p:cNvPr>
-          <p:cNvSpPr>
-            <a:spLocks noGrp="1"/>
-          </p:cNvSpPr>
-          <p:nvPr>
-            <p:ph type="title"/>
-          </p:nvPr>
-        </p:nvSpPr>
-        <p:spPr/>
-        <p:txBody>
-          <a:bodyPr/>
-          <a:lstStyle/>
-          <a:p>
-            <a:r>
-              <a:rPr lang="en-GB" dirty="0"/>
-              <a:t>Tracking Data: Keeping Structure</a:t>
-            </a:r>
-          </a:p>
-        </p:txBody>
-      </p:sp>
-      <p:sp>
-        <p:nvSpPr>
-          <p:cNvPr id="3" name="Content Placeholder 2">
-            <a:extLst>
-              <a:ext uri="{FF2B5EF4-FFF2-40B4-BE49-F238E27FC236}">
-                <a16:creationId xmlns:a16="http://schemas.microsoft.com/office/drawing/2014/main" id="{1CAFF31D-6B71-FD28-0759-A3C83E086230}"/>
-              </a:ext>
-            </a:extLst>
-          </p:cNvPr>
-          <p:cNvSpPr>
-            <a:spLocks noGrp="1"/>
-          </p:cNvSpPr>
-          <p:nvPr>
-            <p:ph idx="1"/>
-          </p:nvPr>
-        </p:nvSpPr>
-        <p:spPr/>
-        <p:txBody>
-          <a:bodyPr/>
-          <a:lstStyle/>
-          <a:p>
-            <a:endParaRPr lang="en-GB"/>
-          </a:p>
-        </p:txBody>
-      </p:sp>
-    </p:spTree>
-    <p:extLst>
-      <p:ext uri="{BB962C8B-B14F-4D97-AF65-F5344CB8AC3E}">
-        <p14:creationId xmlns:p14="http://schemas.microsoft.com/office/powerpoint/2010/main" val="566271480"/>
-      </p:ext>
-    </p:extLst>
-  </p:cSld>
-  <p:clrMapOvr>
-    <a:masterClrMapping/>
-  </p:clrMapOvr>
-</p:sld>
-</file>
-
-<file path=ppt/slides/slide14.xml><?xml version="1.0" encoding="utf-8"?>
-<p:sld xmlns:a="http://schemas.openxmlformats.org/drawingml/2006/main" xmlns:r="http://schemas.openxmlformats.org/officeDocument/2006/relationships" xmlns:p="http://schemas.openxmlformats.org/presentationml/2006/main">
-  <p:cSld>
-    <p:spTree>
-      <p:nvGrpSpPr>
-        <p:cNvPr id="1" name=""/>
-        <p:cNvGrpSpPr/>
-        <p:nvPr/>
-      </p:nvGrpSpPr>
-      <p:grpSpPr>
-        <a:xfrm>
-          <a:off x="0" y="0"/>
-          <a:ext cx="0" cy="0"/>
-          <a:chOff x="0" y="0"/>
-          <a:chExt cx="0" cy="0"/>
-        </a:xfrm>
-      </p:grpSpPr>
-      <p:sp>
-        <p:nvSpPr>
-          <p:cNvPr id="2" name="Title 1">
-            <a:extLst>
-              <a:ext uri="{FF2B5EF4-FFF2-40B4-BE49-F238E27FC236}">
                 <a16:creationId xmlns:a16="http://schemas.microsoft.com/office/drawing/2014/main" id="{4A978013-6541-B9A7-C8FC-2FD05829EF6D}"/>
               </a:ext>
             </a:extLst>
@@ -12912,7 +12833,7 @@
 </p:sld>
 </file>
 
-<file path=ppt/slides/slide15.xml><?xml version="1.0" encoding="utf-8"?>
+<file path=ppt/slides/slide14.xml><?xml version="1.0" encoding="utf-8"?>
 <p:sld xmlns:a="http://schemas.openxmlformats.org/drawingml/2006/main" xmlns:r="http://schemas.openxmlformats.org/officeDocument/2006/relationships" xmlns:p="http://schemas.openxmlformats.org/presentationml/2006/main">
   <p:cSld>
     <p:spTree>
@@ -13181,7 +13102,62 @@
           <a:bodyPr/>
           <a:lstStyle/>
           <a:p>
-            <a:endParaRPr lang="en-GB"/>
+            <a:r>
+              <a:rPr lang="en-GB" dirty="0"/>
+              <a:t>Hockey-Graphs article by Matt Cane: </a:t>
+            </a:r>
+          </a:p>
+          <a:p>
+            <a:pPr marL="0" indent="0">
+              <a:buNone/>
+            </a:pPr>
+            <a:r>
+              <a:rPr lang="en-GB" dirty="0"/>
+              <a:t>	“Measuring Measuring the Importance of Structure on the Power Play” 	from February 2017</a:t>
+            </a:r>
+          </a:p>
+          <a:p>
+            <a:r>
+              <a:rPr lang="en-GB" dirty="0"/>
+              <a:t>Measuring distance from Average Shot location by shot </a:t>
+            </a:r>
+          </a:p>
+          <a:p>
+            <a:r>
+              <a:rPr lang="en-GB" i="1" dirty="0"/>
+              <a:t>Player Structure = (</a:t>
+            </a:r>
+            <a:r>
+              <a:rPr lang="el-GR" i="1" dirty="0"/>
+              <a:t>Σ </a:t>
+            </a:r>
+            <a:r>
+              <a:rPr lang="en-GB" i="1" dirty="0"/>
+              <a:t>Distance of Shot To Player’s Average Shot Location) / (# of Shots For Player)</a:t>
+            </a:r>
+          </a:p>
+          <a:p>
+            <a:r>
+              <a:rPr lang="en-GB" i="1" dirty="0"/>
+              <a:t>Team Structure Index = (</a:t>
+            </a:r>
+            <a:r>
+              <a:rPr lang="el-GR" i="1" dirty="0"/>
+              <a:t>Σ # </a:t>
+            </a:r>
+            <a:r>
+              <a:rPr lang="en-GB" i="1" dirty="0"/>
+              <a:t>of Shots for Player * Player Structure ) / (</a:t>
+            </a:r>
+            <a:r>
+              <a:rPr lang="el-GR" i="1" dirty="0"/>
+              <a:t>Σ # </a:t>
+            </a:r>
+            <a:r>
+              <a:rPr lang="en-GB" i="1" dirty="0"/>
+              <a:t>of Shots for Each Player)</a:t>
+            </a:r>
+            <a:endParaRPr lang="en-GB" dirty="0"/>
           </a:p>
         </p:txBody>
       </p:sp>
@@ -13264,7 +13240,59 @@
           <a:bodyPr/>
           <a:lstStyle/>
           <a:p>
-            <a:endParaRPr lang="en-GB"/>
+            <a:r>
+              <a:rPr lang="en-GB" dirty="0"/>
+              <a:t>Shots taken from dangerous spots?</a:t>
+            </a:r>
+          </a:p>
+          <a:p>
+            <a:pPr marL="0" indent="0">
+              <a:buNone/>
+            </a:pPr>
+            <a:r>
+              <a:rPr lang="en-GB" dirty="0"/>
+              <a:t>	</a:t>
+            </a:r>
+            <a:r>
+              <a:rPr lang="en-GB" dirty="0">
+                <a:sym typeface="Wingdings" pitchFamily="2" charset="2"/>
+              </a:rPr>
+              <a:t> Expected Goals (</a:t>
+            </a:r>
+            <a:r>
+              <a:rPr lang="en-GB" dirty="0" err="1">
+                <a:sym typeface="Wingdings" pitchFamily="2" charset="2"/>
+              </a:rPr>
+              <a:t>xG</a:t>
+            </a:r>
+            <a:r>
+              <a:rPr lang="en-GB" dirty="0">
+                <a:sym typeface="Wingdings" pitchFamily="2" charset="2"/>
+              </a:rPr>
+              <a:t>)</a:t>
+            </a:r>
+            <a:endParaRPr lang="en-GB" dirty="0"/>
+          </a:p>
+          <a:p>
+            <a:r>
+              <a:rPr lang="en-GB" dirty="0"/>
+              <a:t>How much space when taking the shot?</a:t>
+            </a:r>
+          </a:p>
+          <a:p>
+            <a:pPr marL="457200" lvl="1" indent="0">
+              <a:buNone/>
+            </a:pPr>
+            <a:r>
+              <a:rPr lang="en-GB" sz="1800" dirty="0">
+                <a:sym typeface="Wingdings" pitchFamily="2" charset="2"/>
+              </a:rPr>
+              <a:t> Tracking Data</a:t>
+            </a:r>
+            <a:endParaRPr lang="en-GB" sz="1800" dirty="0"/>
+          </a:p>
+          <a:p>
+            <a:endParaRPr lang="en-GB" dirty="0"/>
           </a:p>
         </p:txBody>
       </p:sp>
@@ -13303,7 +13331,7 @@
           <p:cNvPr id="2" name="Title 1">
             <a:extLst>
               <a:ext uri="{FF2B5EF4-FFF2-40B4-BE49-F238E27FC236}">
-                <a16:creationId xmlns:a16="http://schemas.microsoft.com/office/drawing/2014/main" id="{18059263-9C5E-5F4E-6947-E64CB6967656}"/>
+                <a16:creationId xmlns:a16="http://schemas.microsoft.com/office/drawing/2014/main" id="{17F8ADC1-1F31-A882-E762-753CB15FA630}"/>
               </a:ext>
             </a:extLst>
           </p:cNvPr>
@@ -13321,7 +13349,7 @@
           <a:p>
             <a:r>
               <a:rPr lang="en-GB" dirty="0"/>
-              <a:t>Recreate Structure Index</a:t>
+              <a:t>Expected Goals Model</a:t>
             </a:r>
           </a:p>
         </p:txBody>
@@ -13331,7 +13359,7 @@
           <p:cNvPr id="3" name="Content Placeholder 2">
             <a:extLst>
               <a:ext uri="{FF2B5EF4-FFF2-40B4-BE49-F238E27FC236}">
-                <a16:creationId xmlns:a16="http://schemas.microsoft.com/office/drawing/2014/main" id="{0281093C-3899-0025-D6F1-BB52957914B3}"/>
+                <a16:creationId xmlns:a16="http://schemas.microsoft.com/office/drawing/2014/main" id="{B596AFFC-1716-768D-A555-FE56E0082269}"/>
               </a:ext>
             </a:extLst>
           </p:cNvPr>
@@ -13347,14 +13375,75 @@
           <a:bodyPr/>
           <a:lstStyle/>
           <a:p>
-            <a:endParaRPr lang="en-GB"/>
+            <a:r>
+              <a:rPr lang="en-GB" dirty="0"/>
+              <a:t>Feature set: </a:t>
+            </a:r>
+          </a:p>
+          <a:p>
+            <a:pPr lvl="1"/>
+            <a:r>
+              <a:rPr lang="en-GB" dirty="0"/>
+              <a:t>Shot type </a:t>
+            </a:r>
+          </a:p>
+          <a:p>
+            <a:pPr lvl="1"/>
+            <a:r>
+              <a:rPr lang="en-GB" dirty="0"/>
+              <a:t>Coordinates x and y, distance to goal</a:t>
+            </a:r>
+          </a:p>
+          <a:p>
+            <a:pPr lvl="1"/>
+            <a:r>
+              <a:rPr lang="en-GB" dirty="0"/>
+              <a:t>Angle to the goal </a:t>
+            </a:r>
+          </a:p>
+          <a:p>
+            <a:pPr lvl="1"/>
+            <a:r>
+              <a:rPr lang="en-GB" dirty="0"/>
+              <a:t>Shot type, x and y previous two events </a:t>
+            </a:r>
+          </a:p>
+          <a:p>
+            <a:pPr lvl="1"/>
+            <a:r>
+              <a:rPr lang="en-GB" dirty="0"/>
+              <a:t>Time, angle and distance to goal differences between last two events</a:t>
+            </a:r>
+          </a:p>
+          <a:p>
+            <a:pPr lvl="1"/>
+            <a:r>
+              <a:rPr lang="en-GB" dirty="0"/>
+              <a:t>Strength state</a:t>
+            </a:r>
+          </a:p>
+          <a:p>
+            <a:r>
+              <a:rPr lang="en-GB" dirty="0"/>
+              <a:t>XG Boost classifier with grid search</a:t>
+            </a:r>
+          </a:p>
+          <a:p>
+            <a:r>
+              <a:rPr lang="en-GB" dirty="0" err="1"/>
+              <a:t>KFold</a:t>
+            </a:r>
+            <a:r>
+              <a:rPr lang="en-GB" dirty="0"/>
+              <a:t> split training</a:t>
+            </a:r>
           </a:p>
         </p:txBody>
       </p:sp>
     </p:spTree>
     <p:extLst>
       <p:ext uri="{BB962C8B-B14F-4D97-AF65-F5344CB8AC3E}">
-        <p14:creationId xmlns:p14="http://schemas.microsoft.com/office/powerpoint/2010/main" val="1303117498"/>
+        <p14:creationId xmlns:p14="http://schemas.microsoft.com/office/powerpoint/2010/main" val="657673248"/>
       </p:ext>
     </p:extLst>
   </p:cSld>
@@ -13386,7 +13475,7 @@
           <p:cNvPr id="2" name="Title 1">
             <a:extLst>
               <a:ext uri="{FF2B5EF4-FFF2-40B4-BE49-F238E27FC236}">
-                <a16:creationId xmlns:a16="http://schemas.microsoft.com/office/drawing/2014/main" id="{17F8ADC1-1F31-A882-E762-753CB15FA630}"/>
+                <a16:creationId xmlns:a16="http://schemas.microsoft.com/office/drawing/2014/main" id="{C3B156FA-126E-55FF-AB6E-D38713DCFF37}"/>
               </a:ext>
             </a:extLst>
           </p:cNvPr>
@@ -13403,8 +13492,8 @@
           <a:lstStyle/>
           <a:p>
             <a:r>
-              <a:rPr lang="en-GB" dirty="0"/>
-              <a:t>Expected Goals Model</a:t>
+              <a:rPr lang="en-CH" dirty="0"/>
+              <a:t>xG Index</a:t>
             </a:r>
           </a:p>
         </p:txBody>
@@ -13414,7 +13503,7 @@
           <p:cNvPr id="3" name="Content Placeholder 2">
             <a:extLst>
               <a:ext uri="{FF2B5EF4-FFF2-40B4-BE49-F238E27FC236}">
-                <a16:creationId xmlns:a16="http://schemas.microsoft.com/office/drawing/2014/main" id="{B596AFFC-1716-768D-A555-FE56E0082269}"/>
+                <a16:creationId xmlns:a16="http://schemas.microsoft.com/office/drawing/2014/main" id="{6171A989-BAF1-8EA8-24F1-5C6834A5A154}"/>
               </a:ext>
             </a:extLst>
           </p:cNvPr>
@@ -13430,14 +13519,118 @@
           <a:bodyPr/>
           <a:lstStyle/>
           <a:p>
-            <a:endParaRPr lang="en-GB"/>
+            <a:r>
+              <a:rPr lang="en-GB" dirty="0"/>
+              <a:t>I</a:t>
+            </a:r>
+            <a:r>
+              <a:rPr lang="en-CH" dirty="0"/>
+              <a:t>ntermediate step to Danger Index </a:t>
+            </a:r>
+          </a:p>
+          <a:p>
+            <a:endParaRPr lang="en-CH" dirty="0"/>
+          </a:p>
+          <a:p>
+            <a:r>
+              <a:rPr lang="en-GB" i="1" dirty="0"/>
+              <a:t>Player </a:t>
+            </a:r>
+            <a:r>
+              <a:rPr lang="en-GB" i="1" dirty="0" err="1"/>
+              <a:t>xG</a:t>
+            </a:r>
+            <a:r>
+              <a:rPr lang="en-GB" i="1" dirty="0"/>
+              <a:t> Index = </a:t>
+            </a:r>
+            <a:r>
+              <a:rPr lang="el-GR" i="1" dirty="0"/>
+              <a:t>Σ</a:t>
+            </a:r>
+            <a:r>
+              <a:rPr lang="de-CH" i="1" dirty="0"/>
+              <a:t>(</a:t>
+            </a:r>
+            <a:r>
+              <a:rPr lang="de-CH" i="1" dirty="0" err="1"/>
+              <a:t>xG</a:t>
+            </a:r>
+            <a:r>
+              <a:rPr lang="de-CH" i="1" dirty="0"/>
+              <a:t> – Average </a:t>
+            </a:r>
+            <a:r>
+              <a:rPr lang="de-CH" i="1" dirty="0" err="1"/>
+              <a:t>xG</a:t>
+            </a:r>
+            <a:r>
+              <a:rPr lang="en-GB" i="1" dirty="0"/>
+              <a:t>) / (# of Shots For Player)</a:t>
+            </a:r>
+          </a:p>
+          <a:p>
+            <a:endParaRPr lang="en-GB" i="1" dirty="0"/>
+          </a:p>
+          <a:p>
+            <a:r>
+              <a:rPr lang="en-GB" i="1" dirty="0"/>
+              <a:t>Team </a:t>
+            </a:r>
+            <a:r>
+              <a:rPr lang="en-GB" i="1" dirty="0" err="1"/>
+              <a:t>xG</a:t>
+            </a:r>
+            <a:r>
+              <a:rPr lang="en-GB" i="1" dirty="0"/>
+              <a:t> Index = </a:t>
+            </a:r>
+            <a:r>
+              <a:rPr lang="el-GR" i="1" dirty="0"/>
+              <a:t>Σ</a:t>
+            </a:r>
+            <a:r>
+              <a:rPr lang="en-GB" i="1" dirty="0"/>
+              <a:t>(</a:t>
+            </a:r>
+            <a:r>
+              <a:rPr lang="el-GR" i="1" dirty="0"/>
+              <a:t>Σ # </a:t>
+            </a:r>
+            <a:r>
+              <a:rPr lang="en-GB" i="1" dirty="0"/>
+              <a:t>of Shots for Player * Player </a:t>
+            </a:r>
+            <a:r>
+              <a:rPr lang="en-GB" i="1" dirty="0" err="1"/>
+              <a:t>xG</a:t>
+            </a:r>
+            <a:r>
+              <a:rPr lang="en-GB" i="1" dirty="0"/>
+              <a:t> Index ) / (</a:t>
+            </a:r>
+            <a:r>
+              <a:rPr lang="el-GR" i="1" dirty="0"/>
+              <a:t>Σ # </a:t>
+            </a:r>
+            <a:r>
+              <a:rPr lang="en-GB" i="1" dirty="0"/>
+              <a:t>of Shots for Each Player)</a:t>
+            </a:r>
+            <a:endParaRPr lang="en-GB" dirty="0"/>
+          </a:p>
+          <a:p>
+            <a:endParaRPr lang="en-GB" i="1" dirty="0"/>
+          </a:p>
+          <a:p>
+            <a:endParaRPr lang="en-CH" dirty="0"/>
           </a:p>
         </p:txBody>
       </p:sp>
     </p:spTree>
     <p:extLst>
       <p:ext uri="{BB962C8B-B14F-4D97-AF65-F5344CB8AC3E}">
-        <p14:creationId xmlns:p14="http://schemas.microsoft.com/office/powerpoint/2010/main" val="657673248"/>
+        <p14:creationId xmlns:p14="http://schemas.microsoft.com/office/powerpoint/2010/main" val="4137554405"/>
       </p:ext>
     </p:extLst>
   </p:cSld>
@@ -13487,7 +13680,7 @@
           <a:p>
             <a:r>
               <a:rPr lang="en-GB" dirty="0"/>
-              <a:t>Power Play Player Danger Index</a:t>
+              <a:t>Power Play Danger Index</a:t>
             </a:r>
           </a:p>
         </p:txBody>
@@ -13513,7 +13706,7 @@
           <a:bodyPr/>
           <a:lstStyle/>
           <a:p>
-            <a:endParaRPr lang="en-GB"/>
+            <a:endParaRPr lang="en-GB" dirty="0"/>
           </a:p>
         </p:txBody>
       </p:sp>
@@ -13552,7 +13745,7 @@
           <p:cNvPr id="2" name="Title 1">
             <a:extLst>
               <a:ext uri="{FF2B5EF4-FFF2-40B4-BE49-F238E27FC236}">
-                <a16:creationId xmlns:a16="http://schemas.microsoft.com/office/drawing/2014/main" id="{559911AC-C7F3-93D6-B878-E912FC52C09F}"/>
+                <a16:creationId xmlns:a16="http://schemas.microsoft.com/office/drawing/2014/main" id="{DCD01A4B-19B9-150A-5C86-60E27127E57D}"/>
               </a:ext>
             </a:extLst>
           </p:cNvPr>
@@ -13570,7 +13763,7 @@
           <a:p>
             <a:r>
               <a:rPr lang="en-GB" dirty="0"/>
-              <a:t>Power Play Team Danger Index</a:t>
+              <a:t>Results Olympics</a:t>
             </a:r>
           </a:p>
         </p:txBody>
@@ -13580,7 +13773,7 @@
           <p:cNvPr id="3" name="Content Placeholder 2">
             <a:extLst>
               <a:ext uri="{FF2B5EF4-FFF2-40B4-BE49-F238E27FC236}">
-                <a16:creationId xmlns:a16="http://schemas.microsoft.com/office/drawing/2014/main" id="{24AC881F-6A3C-D658-E5A4-1B038F971999}"/>
+                <a16:creationId xmlns:a16="http://schemas.microsoft.com/office/drawing/2014/main" id="{335E7FF4-A946-BE48-A574-9B2906E50946}"/>
               </a:ext>
             </a:extLst>
           </p:cNvPr>
@@ -13603,7 +13796,7 @@
     </p:spTree>
     <p:extLst>
       <p:ext uri="{BB962C8B-B14F-4D97-AF65-F5344CB8AC3E}">
-        <p14:creationId xmlns:p14="http://schemas.microsoft.com/office/powerpoint/2010/main" val="3269265068"/>
+        <p14:creationId xmlns:p14="http://schemas.microsoft.com/office/powerpoint/2010/main" val="3580316750"/>
       </p:ext>
     </p:extLst>
   </p:cSld>
@@ -13635,7 +13828,7 @@
           <p:cNvPr id="2" name="Title 1">
             <a:extLst>
               <a:ext uri="{FF2B5EF4-FFF2-40B4-BE49-F238E27FC236}">
-                <a16:creationId xmlns:a16="http://schemas.microsoft.com/office/drawing/2014/main" id="{DCD01A4B-19B9-150A-5C86-60E27127E57D}"/>
+                <a16:creationId xmlns:a16="http://schemas.microsoft.com/office/drawing/2014/main" id="{D7149846-BE3C-2251-3434-040C151638B6}"/>
               </a:ext>
             </a:extLst>
           </p:cNvPr>
@@ -13653,7 +13846,7 @@
           <a:p>
             <a:r>
               <a:rPr lang="en-GB" dirty="0"/>
-              <a:t>Results Olympics</a:t>
+              <a:t>Results NWHL</a:t>
             </a:r>
           </a:p>
         </p:txBody>
@@ -13663,7 +13856,7 @@
           <p:cNvPr id="3" name="Content Placeholder 2">
             <a:extLst>
               <a:ext uri="{FF2B5EF4-FFF2-40B4-BE49-F238E27FC236}">
-                <a16:creationId xmlns:a16="http://schemas.microsoft.com/office/drawing/2014/main" id="{335E7FF4-A946-BE48-A574-9B2906E50946}"/>
+                <a16:creationId xmlns:a16="http://schemas.microsoft.com/office/drawing/2014/main" id="{A013E51C-3D44-B7A8-B16D-CE63156589EE}"/>
               </a:ext>
             </a:extLst>
           </p:cNvPr>
@@ -13686,7 +13879,7 @@
     </p:spTree>
     <p:extLst>
       <p:ext uri="{BB962C8B-B14F-4D97-AF65-F5344CB8AC3E}">
-        <p14:creationId xmlns:p14="http://schemas.microsoft.com/office/powerpoint/2010/main" val="3580316750"/>
+        <p14:creationId xmlns:p14="http://schemas.microsoft.com/office/powerpoint/2010/main" val="2190234350"/>
       </p:ext>
     </p:extLst>
   </p:cSld>

</xml_diff>